<commit_message>
fix 2d line PARALLEL SHIFT
</commit_message>
<xml_diff>
--- a/gr/Microsoft.VisualBasic.Imaging/Drawing2D/Figures.pptx
+++ b/gr/Microsoft.VisualBasic.Imaging/Drawing2D/Figures.pptx
@@ -104,7 +104,27 @@
       </a:defRPr>
     </a:lvl9pPr>
   </p:defaultTextStyle>
+  <p:extLst>
+    <p:ext uri="{EFAFB233-063F-42B5-8137-9DF3F51BA10A}">
+      <p15:sldGuideLst xmlns:p15="http://schemas.microsoft.com/office/powerpoint/2012/main">
+        <p15:guide id="1" orient="horz" pos="2160">
+          <p15:clr>
+            <a:srgbClr val="A4A3A4"/>
+          </p15:clr>
+        </p15:guide>
+        <p15:guide id="2" pos="2880">
+          <p15:clr>
+            <a:srgbClr val="A4A3A4"/>
+          </p15:clr>
+        </p15:guide>
+      </p15:sldGuideLst>
+    </p:ext>
+  </p:extLst>
 </p:presentation>
+</file>
+
+<file path=ppt/revisionInfo.xml><?xml version="1.0" encoding="utf-8"?>
+<p1510:revInfo xmlns:a="http://schemas.openxmlformats.org/drawingml/2006/main" xmlns:r="http://schemas.openxmlformats.org/officeDocument/2006/relationships" xmlns:p1510="http://schemas.microsoft.com/office/powerpoint/2015/10/main"/>
 </file>
 
 <file path=ppt/slideLayouts/slideLayout1.xml><?xml version="1.0" encoding="utf-8"?>
@@ -145,10 +165,9 @@
           <a:lstStyle/>
           <a:p>
             <a:r>
-              <a:rPr lang="zh-CN" altLang="en-US" smtClean="0"/>
+              <a:rPr lang="zh-CN" altLang="en-US"/>
               <a:t>单击此处编辑母版标题样式</a:t>
             </a:r>
-            <a:endParaRPr lang="zh-CN" altLang="en-US"/>
           </a:p>
         </p:txBody>
       </p:sp>
@@ -264,10 +283,9 @@
           </a:lstStyle>
           <a:p>
             <a:r>
-              <a:rPr lang="zh-CN" altLang="en-US" smtClean="0"/>
+              <a:rPr lang="zh-CN" altLang="en-US"/>
               <a:t>单击此处编辑母版副标题样式</a:t>
             </a:r>
-            <a:endParaRPr lang="zh-CN" altLang="en-US"/>
           </a:p>
         </p:txBody>
       </p:sp>
@@ -288,7 +306,7 @@
           <a:p>
             <a:fld id="{530820CF-B880-4189-942D-D702A7CBA730}" type="datetimeFigureOut">
               <a:rPr lang="zh-CN" altLang="en-US" smtClean="0"/>
-              <a:t>2017/7/29</a:t>
+              <a:t>2017/7/30</a:t>
             </a:fld>
             <a:endParaRPr lang="zh-CN" altLang="en-US"/>
           </a:p>
@@ -377,10 +395,9 @@
           <a:lstStyle/>
           <a:p>
             <a:r>
-              <a:rPr lang="zh-CN" altLang="en-US" smtClean="0"/>
+              <a:rPr lang="zh-CN" altLang="en-US"/>
               <a:t>单击此处编辑母版标题样式</a:t>
             </a:r>
-            <a:endParaRPr lang="zh-CN" altLang="en-US"/>
           </a:p>
         </p:txBody>
       </p:sp>
@@ -401,38 +418,37 @@
           <a:p>
             <a:pPr lvl="0"/>
             <a:r>
-              <a:rPr lang="zh-CN" altLang="en-US" smtClean="0"/>
+              <a:rPr lang="zh-CN" altLang="en-US"/>
               <a:t>单击此处编辑母版文本样式</a:t>
             </a:r>
           </a:p>
           <a:p>
             <a:pPr lvl="1"/>
             <a:r>
-              <a:rPr lang="zh-CN" altLang="en-US" smtClean="0"/>
+              <a:rPr lang="zh-CN" altLang="en-US"/>
               <a:t>第二级</a:t>
             </a:r>
           </a:p>
           <a:p>
             <a:pPr lvl="2"/>
             <a:r>
-              <a:rPr lang="zh-CN" altLang="en-US" smtClean="0"/>
+              <a:rPr lang="zh-CN" altLang="en-US"/>
               <a:t>第三级</a:t>
             </a:r>
           </a:p>
           <a:p>
             <a:pPr lvl="3"/>
             <a:r>
-              <a:rPr lang="zh-CN" altLang="en-US" smtClean="0"/>
+              <a:rPr lang="zh-CN" altLang="en-US"/>
               <a:t>第四级</a:t>
             </a:r>
           </a:p>
           <a:p>
             <a:pPr lvl="4"/>
             <a:r>
-              <a:rPr lang="zh-CN" altLang="en-US" smtClean="0"/>
+              <a:rPr lang="zh-CN" altLang="en-US"/>
               <a:t>第五级</a:t>
             </a:r>
-            <a:endParaRPr lang="zh-CN" altLang="en-US"/>
           </a:p>
         </p:txBody>
       </p:sp>
@@ -453,7 +469,7 @@
           <a:p>
             <a:fld id="{530820CF-B880-4189-942D-D702A7CBA730}" type="datetimeFigureOut">
               <a:rPr lang="zh-CN" altLang="en-US" smtClean="0"/>
-              <a:t>2017/7/29</a:t>
+              <a:t>2017/7/30</a:t>
             </a:fld>
             <a:endParaRPr lang="zh-CN" altLang="en-US"/>
           </a:p>
@@ -547,10 +563,9 @@
           <a:lstStyle/>
           <a:p>
             <a:r>
-              <a:rPr lang="zh-CN" altLang="en-US" smtClean="0"/>
+              <a:rPr lang="zh-CN" altLang="en-US"/>
               <a:t>单击此处编辑母版标题样式</a:t>
             </a:r>
-            <a:endParaRPr lang="zh-CN" altLang="en-US"/>
           </a:p>
         </p:txBody>
       </p:sp>
@@ -576,38 +591,37 @@
           <a:p>
             <a:pPr lvl="0"/>
             <a:r>
-              <a:rPr lang="zh-CN" altLang="en-US" smtClean="0"/>
+              <a:rPr lang="zh-CN" altLang="en-US"/>
               <a:t>单击此处编辑母版文本样式</a:t>
             </a:r>
           </a:p>
           <a:p>
             <a:pPr lvl="1"/>
             <a:r>
-              <a:rPr lang="zh-CN" altLang="en-US" smtClean="0"/>
+              <a:rPr lang="zh-CN" altLang="en-US"/>
               <a:t>第二级</a:t>
             </a:r>
           </a:p>
           <a:p>
             <a:pPr lvl="2"/>
             <a:r>
-              <a:rPr lang="zh-CN" altLang="en-US" smtClean="0"/>
+              <a:rPr lang="zh-CN" altLang="en-US"/>
               <a:t>第三级</a:t>
             </a:r>
           </a:p>
           <a:p>
             <a:pPr lvl="3"/>
             <a:r>
-              <a:rPr lang="zh-CN" altLang="en-US" smtClean="0"/>
+              <a:rPr lang="zh-CN" altLang="en-US"/>
               <a:t>第四级</a:t>
             </a:r>
           </a:p>
           <a:p>
             <a:pPr lvl="4"/>
             <a:r>
-              <a:rPr lang="zh-CN" altLang="en-US" smtClean="0"/>
+              <a:rPr lang="zh-CN" altLang="en-US"/>
               <a:t>第五级</a:t>
             </a:r>
-            <a:endParaRPr lang="zh-CN" altLang="en-US"/>
           </a:p>
         </p:txBody>
       </p:sp>
@@ -628,7 +642,7 @@
           <a:p>
             <a:fld id="{530820CF-B880-4189-942D-D702A7CBA730}" type="datetimeFigureOut">
               <a:rPr lang="zh-CN" altLang="en-US" smtClean="0"/>
-              <a:t>2017/7/29</a:t>
+              <a:t>2017/7/30</a:t>
             </a:fld>
             <a:endParaRPr lang="zh-CN" altLang="en-US"/>
           </a:p>
@@ -717,10 +731,9 @@
           <a:lstStyle/>
           <a:p>
             <a:r>
-              <a:rPr lang="zh-CN" altLang="en-US" smtClean="0"/>
+              <a:rPr lang="zh-CN" altLang="en-US"/>
               <a:t>单击此处编辑母版标题样式</a:t>
             </a:r>
-            <a:endParaRPr lang="zh-CN" altLang="en-US"/>
           </a:p>
         </p:txBody>
       </p:sp>
@@ -741,38 +754,37 @@
           <a:p>
             <a:pPr lvl="0"/>
             <a:r>
-              <a:rPr lang="zh-CN" altLang="en-US" smtClean="0"/>
+              <a:rPr lang="zh-CN" altLang="en-US"/>
               <a:t>单击此处编辑母版文本样式</a:t>
             </a:r>
           </a:p>
           <a:p>
             <a:pPr lvl="1"/>
             <a:r>
-              <a:rPr lang="zh-CN" altLang="en-US" smtClean="0"/>
+              <a:rPr lang="zh-CN" altLang="en-US"/>
               <a:t>第二级</a:t>
             </a:r>
           </a:p>
           <a:p>
             <a:pPr lvl="2"/>
             <a:r>
-              <a:rPr lang="zh-CN" altLang="en-US" smtClean="0"/>
+              <a:rPr lang="zh-CN" altLang="en-US"/>
               <a:t>第三级</a:t>
             </a:r>
           </a:p>
           <a:p>
             <a:pPr lvl="3"/>
             <a:r>
-              <a:rPr lang="zh-CN" altLang="en-US" smtClean="0"/>
+              <a:rPr lang="zh-CN" altLang="en-US"/>
               <a:t>第四级</a:t>
             </a:r>
           </a:p>
           <a:p>
             <a:pPr lvl="4"/>
             <a:r>
-              <a:rPr lang="zh-CN" altLang="en-US" smtClean="0"/>
+              <a:rPr lang="zh-CN" altLang="en-US"/>
               <a:t>第五级</a:t>
             </a:r>
-            <a:endParaRPr lang="zh-CN" altLang="en-US"/>
           </a:p>
         </p:txBody>
       </p:sp>
@@ -793,7 +805,7 @@
           <a:p>
             <a:fld id="{530820CF-B880-4189-942D-D702A7CBA730}" type="datetimeFigureOut">
               <a:rPr lang="zh-CN" altLang="en-US" smtClean="0"/>
-              <a:t>2017/7/29</a:t>
+              <a:t>2017/7/30</a:t>
             </a:fld>
             <a:endParaRPr lang="zh-CN" altLang="en-US"/>
           </a:p>
@@ -891,10 +903,9 @@
           </a:lstStyle>
           <a:p>
             <a:r>
-              <a:rPr lang="zh-CN" altLang="en-US" smtClean="0"/>
+              <a:rPr lang="zh-CN" altLang="en-US"/>
               <a:t>单击此处编辑母版标题样式</a:t>
             </a:r>
-            <a:endParaRPr lang="zh-CN" altLang="en-US"/>
           </a:p>
         </p:txBody>
       </p:sp>
@@ -1011,7 +1022,7 @@
           <a:p>
             <a:pPr lvl="0"/>
             <a:r>
-              <a:rPr lang="zh-CN" altLang="en-US" smtClean="0"/>
+              <a:rPr lang="zh-CN" altLang="en-US"/>
               <a:t>单击此处编辑母版文本样式</a:t>
             </a:r>
           </a:p>
@@ -1034,7 +1045,7 @@
           <a:p>
             <a:fld id="{530820CF-B880-4189-942D-D702A7CBA730}" type="datetimeFigureOut">
               <a:rPr lang="zh-CN" altLang="en-US" smtClean="0"/>
-              <a:t>2017/7/29</a:t>
+              <a:t>2017/7/30</a:t>
             </a:fld>
             <a:endParaRPr lang="zh-CN" altLang="en-US"/>
           </a:p>
@@ -1123,10 +1134,9 @@
           <a:lstStyle/>
           <a:p>
             <a:r>
-              <a:rPr lang="zh-CN" altLang="en-US" smtClean="0"/>
+              <a:rPr lang="zh-CN" altLang="en-US"/>
               <a:t>单击此处编辑母版标题样式</a:t>
             </a:r>
-            <a:endParaRPr lang="zh-CN" altLang="en-US"/>
           </a:p>
         </p:txBody>
       </p:sp>
@@ -1180,38 +1190,37 @@
           <a:p>
             <a:pPr lvl="0"/>
             <a:r>
-              <a:rPr lang="zh-CN" altLang="en-US" smtClean="0"/>
+              <a:rPr lang="zh-CN" altLang="en-US"/>
               <a:t>单击此处编辑母版文本样式</a:t>
             </a:r>
           </a:p>
           <a:p>
             <a:pPr lvl="1"/>
             <a:r>
-              <a:rPr lang="zh-CN" altLang="en-US" smtClean="0"/>
+              <a:rPr lang="zh-CN" altLang="en-US"/>
               <a:t>第二级</a:t>
             </a:r>
           </a:p>
           <a:p>
             <a:pPr lvl="2"/>
             <a:r>
-              <a:rPr lang="zh-CN" altLang="en-US" smtClean="0"/>
+              <a:rPr lang="zh-CN" altLang="en-US"/>
               <a:t>第三级</a:t>
             </a:r>
           </a:p>
           <a:p>
             <a:pPr lvl="3"/>
             <a:r>
-              <a:rPr lang="zh-CN" altLang="en-US" smtClean="0"/>
+              <a:rPr lang="zh-CN" altLang="en-US"/>
               <a:t>第四级</a:t>
             </a:r>
           </a:p>
           <a:p>
             <a:pPr lvl="4"/>
             <a:r>
-              <a:rPr lang="zh-CN" altLang="en-US" smtClean="0"/>
+              <a:rPr lang="zh-CN" altLang="en-US"/>
               <a:t>第五级</a:t>
             </a:r>
-            <a:endParaRPr lang="zh-CN" altLang="en-US"/>
           </a:p>
         </p:txBody>
       </p:sp>
@@ -1265,38 +1274,37 @@
           <a:p>
             <a:pPr lvl="0"/>
             <a:r>
-              <a:rPr lang="zh-CN" altLang="en-US" smtClean="0"/>
+              <a:rPr lang="zh-CN" altLang="en-US"/>
               <a:t>单击此处编辑母版文本样式</a:t>
             </a:r>
           </a:p>
           <a:p>
             <a:pPr lvl="1"/>
             <a:r>
-              <a:rPr lang="zh-CN" altLang="en-US" smtClean="0"/>
+              <a:rPr lang="zh-CN" altLang="en-US"/>
               <a:t>第二级</a:t>
             </a:r>
           </a:p>
           <a:p>
             <a:pPr lvl="2"/>
             <a:r>
-              <a:rPr lang="zh-CN" altLang="en-US" smtClean="0"/>
+              <a:rPr lang="zh-CN" altLang="en-US"/>
               <a:t>第三级</a:t>
             </a:r>
           </a:p>
           <a:p>
             <a:pPr lvl="3"/>
             <a:r>
-              <a:rPr lang="zh-CN" altLang="en-US" smtClean="0"/>
+              <a:rPr lang="zh-CN" altLang="en-US"/>
               <a:t>第四级</a:t>
             </a:r>
           </a:p>
           <a:p>
             <a:pPr lvl="4"/>
             <a:r>
-              <a:rPr lang="zh-CN" altLang="en-US" smtClean="0"/>
+              <a:rPr lang="zh-CN" altLang="en-US"/>
               <a:t>第五级</a:t>
             </a:r>
-            <a:endParaRPr lang="zh-CN" altLang="en-US"/>
           </a:p>
         </p:txBody>
       </p:sp>
@@ -1317,7 +1325,7 @@
           <a:p>
             <a:fld id="{530820CF-B880-4189-942D-D702A7CBA730}" type="datetimeFigureOut">
               <a:rPr lang="zh-CN" altLang="en-US" smtClean="0"/>
-              <a:t>2017/7/29</a:t>
+              <a:t>2017/7/30</a:t>
             </a:fld>
             <a:endParaRPr lang="zh-CN" altLang="en-US"/>
           </a:p>
@@ -1410,10 +1418,9 @@
           </a:lstStyle>
           <a:p>
             <a:r>
-              <a:rPr lang="zh-CN" altLang="en-US" smtClean="0"/>
+              <a:rPr lang="zh-CN" altLang="en-US"/>
               <a:t>单击此处编辑母版标题样式</a:t>
             </a:r>
-            <a:endParaRPr lang="zh-CN" altLang="en-US"/>
           </a:p>
         </p:txBody>
       </p:sp>
@@ -1476,7 +1483,7 @@
           <a:p>
             <a:pPr lvl="0"/>
             <a:r>
-              <a:rPr lang="zh-CN" altLang="en-US" smtClean="0"/>
+              <a:rPr lang="zh-CN" altLang="en-US"/>
               <a:t>单击此处编辑母版文本样式</a:t>
             </a:r>
           </a:p>
@@ -1532,38 +1539,37 @@
           <a:p>
             <a:pPr lvl="0"/>
             <a:r>
-              <a:rPr lang="zh-CN" altLang="en-US" smtClean="0"/>
+              <a:rPr lang="zh-CN" altLang="en-US"/>
               <a:t>单击此处编辑母版文本样式</a:t>
             </a:r>
           </a:p>
           <a:p>
             <a:pPr lvl="1"/>
             <a:r>
-              <a:rPr lang="zh-CN" altLang="en-US" smtClean="0"/>
+              <a:rPr lang="zh-CN" altLang="en-US"/>
               <a:t>第二级</a:t>
             </a:r>
           </a:p>
           <a:p>
             <a:pPr lvl="2"/>
             <a:r>
-              <a:rPr lang="zh-CN" altLang="en-US" smtClean="0"/>
+              <a:rPr lang="zh-CN" altLang="en-US"/>
               <a:t>第三级</a:t>
             </a:r>
           </a:p>
           <a:p>
             <a:pPr lvl="3"/>
             <a:r>
-              <a:rPr lang="zh-CN" altLang="en-US" smtClean="0"/>
+              <a:rPr lang="zh-CN" altLang="en-US"/>
               <a:t>第四级</a:t>
             </a:r>
           </a:p>
           <a:p>
             <a:pPr lvl="4"/>
             <a:r>
-              <a:rPr lang="zh-CN" altLang="en-US" smtClean="0"/>
+              <a:rPr lang="zh-CN" altLang="en-US"/>
               <a:t>第五级</a:t>
             </a:r>
-            <a:endParaRPr lang="zh-CN" altLang="en-US"/>
           </a:p>
         </p:txBody>
       </p:sp>
@@ -1626,7 +1632,7 @@
           <a:p>
             <a:pPr lvl="0"/>
             <a:r>
-              <a:rPr lang="zh-CN" altLang="en-US" smtClean="0"/>
+              <a:rPr lang="zh-CN" altLang="en-US"/>
               <a:t>单击此处编辑母版文本样式</a:t>
             </a:r>
           </a:p>
@@ -1682,38 +1688,37 @@
           <a:p>
             <a:pPr lvl="0"/>
             <a:r>
-              <a:rPr lang="zh-CN" altLang="en-US" smtClean="0"/>
+              <a:rPr lang="zh-CN" altLang="en-US"/>
               <a:t>单击此处编辑母版文本样式</a:t>
             </a:r>
           </a:p>
           <a:p>
             <a:pPr lvl="1"/>
             <a:r>
-              <a:rPr lang="zh-CN" altLang="en-US" smtClean="0"/>
+              <a:rPr lang="zh-CN" altLang="en-US"/>
               <a:t>第二级</a:t>
             </a:r>
           </a:p>
           <a:p>
             <a:pPr lvl="2"/>
             <a:r>
-              <a:rPr lang="zh-CN" altLang="en-US" smtClean="0"/>
+              <a:rPr lang="zh-CN" altLang="en-US"/>
               <a:t>第三级</a:t>
             </a:r>
           </a:p>
           <a:p>
             <a:pPr lvl="3"/>
             <a:r>
-              <a:rPr lang="zh-CN" altLang="en-US" smtClean="0"/>
+              <a:rPr lang="zh-CN" altLang="en-US"/>
               <a:t>第四级</a:t>
             </a:r>
           </a:p>
           <a:p>
             <a:pPr lvl="4"/>
             <a:r>
-              <a:rPr lang="zh-CN" altLang="en-US" smtClean="0"/>
+              <a:rPr lang="zh-CN" altLang="en-US"/>
               <a:t>第五级</a:t>
             </a:r>
-            <a:endParaRPr lang="zh-CN" altLang="en-US"/>
           </a:p>
         </p:txBody>
       </p:sp>
@@ -1734,7 +1739,7 @@
           <a:p>
             <a:fld id="{530820CF-B880-4189-942D-D702A7CBA730}" type="datetimeFigureOut">
               <a:rPr lang="zh-CN" altLang="en-US" smtClean="0"/>
-              <a:t>2017/7/29</a:t>
+              <a:t>2017/7/30</a:t>
             </a:fld>
             <a:endParaRPr lang="zh-CN" altLang="en-US"/>
           </a:p>
@@ -1823,10 +1828,9 @@
           <a:lstStyle/>
           <a:p>
             <a:r>
-              <a:rPr lang="zh-CN" altLang="en-US" smtClean="0"/>
+              <a:rPr lang="zh-CN" altLang="en-US"/>
               <a:t>单击此处编辑母版标题样式</a:t>
             </a:r>
-            <a:endParaRPr lang="zh-CN" altLang="en-US"/>
           </a:p>
         </p:txBody>
       </p:sp>
@@ -1847,7 +1851,7 @@
           <a:p>
             <a:fld id="{530820CF-B880-4189-942D-D702A7CBA730}" type="datetimeFigureOut">
               <a:rPr lang="zh-CN" altLang="en-US" smtClean="0"/>
-              <a:t>2017/7/29</a:t>
+              <a:t>2017/7/30</a:t>
             </a:fld>
             <a:endParaRPr lang="zh-CN" altLang="en-US"/>
           </a:p>
@@ -1937,7 +1941,7 @@
           <a:p>
             <a:fld id="{530820CF-B880-4189-942D-D702A7CBA730}" type="datetimeFigureOut">
               <a:rPr lang="zh-CN" altLang="en-US" smtClean="0"/>
-              <a:t>2017/7/29</a:t>
+              <a:t>2017/7/30</a:t>
             </a:fld>
             <a:endParaRPr lang="zh-CN" altLang="en-US"/>
           </a:p>
@@ -2035,10 +2039,9 @@
           </a:lstStyle>
           <a:p>
             <a:r>
-              <a:rPr lang="zh-CN" altLang="en-US" smtClean="0"/>
+              <a:rPr lang="zh-CN" altLang="en-US"/>
               <a:t>单击此处编辑母版标题样式</a:t>
             </a:r>
-            <a:endParaRPr lang="zh-CN" altLang="en-US"/>
           </a:p>
         </p:txBody>
       </p:sp>
@@ -2092,38 +2095,37 @@
           <a:p>
             <a:pPr lvl="0"/>
             <a:r>
-              <a:rPr lang="zh-CN" altLang="en-US" smtClean="0"/>
+              <a:rPr lang="zh-CN" altLang="en-US"/>
               <a:t>单击此处编辑母版文本样式</a:t>
             </a:r>
           </a:p>
           <a:p>
             <a:pPr lvl="1"/>
             <a:r>
-              <a:rPr lang="zh-CN" altLang="en-US" smtClean="0"/>
+              <a:rPr lang="zh-CN" altLang="en-US"/>
               <a:t>第二级</a:t>
             </a:r>
           </a:p>
           <a:p>
             <a:pPr lvl="2"/>
             <a:r>
-              <a:rPr lang="zh-CN" altLang="en-US" smtClean="0"/>
+              <a:rPr lang="zh-CN" altLang="en-US"/>
               <a:t>第三级</a:t>
             </a:r>
           </a:p>
           <a:p>
             <a:pPr lvl="3"/>
             <a:r>
-              <a:rPr lang="zh-CN" altLang="en-US" smtClean="0"/>
+              <a:rPr lang="zh-CN" altLang="en-US"/>
               <a:t>第四级</a:t>
             </a:r>
           </a:p>
           <a:p>
             <a:pPr lvl="4"/>
             <a:r>
-              <a:rPr lang="zh-CN" altLang="en-US" smtClean="0"/>
+              <a:rPr lang="zh-CN" altLang="en-US"/>
               <a:t>第五级</a:t>
             </a:r>
-            <a:endParaRPr lang="zh-CN" altLang="en-US"/>
           </a:p>
         </p:txBody>
       </p:sp>
@@ -2186,7 +2188,7 @@
           <a:p>
             <a:pPr lvl="0"/>
             <a:r>
-              <a:rPr lang="zh-CN" altLang="en-US" smtClean="0"/>
+              <a:rPr lang="zh-CN" altLang="en-US"/>
               <a:t>单击此处编辑母版文本样式</a:t>
             </a:r>
           </a:p>
@@ -2209,7 +2211,7 @@
           <a:p>
             <a:fld id="{530820CF-B880-4189-942D-D702A7CBA730}" type="datetimeFigureOut">
               <a:rPr lang="zh-CN" altLang="en-US" smtClean="0"/>
-              <a:t>2017/7/29</a:t>
+              <a:t>2017/7/30</a:t>
             </a:fld>
             <a:endParaRPr lang="zh-CN" altLang="en-US"/>
           </a:p>
@@ -2307,10 +2309,9 @@
           </a:lstStyle>
           <a:p>
             <a:r>
-              <a:rPr lang="zh-CN" altLang="en-US" smtClean="0"/>
+              <a:rPr lang="zh-CN" altLang="en-US"/>
               <a:t>单击此处编辑母版标题样式</a:t>
             </a:r>
-            <a:endParaRPr lang="zh-CN" altLang="en-US"/>
           </a:p>
         </p:txBody>
       </p:sp>
@@ -2434,7 +2435,7 @@
           <a:p>
             <a:pPr lvl="0"/>
             <a:r>
-              <a:rPr lang="zh-CN" altLang="en-US" smtClean="0"/>
+              <a:rPr lang="zh-CN" altLang="en-US"/>
               <a:t>单击此处编辑母版文本样式</a:t>
             </a:r>
           </a:p>
@@ -2457,7 +2458,7 @@
           <a:p>
             <a:fld id="{530820CF-B880-4189-942D-D702A7CBA730}" type="datetimeFigureOut">
               <a:rPr lang="zh-CN" altLang="en-US" smtClean="0"/>
-              <a:t>2017/7/29</a:t>
+              <a:t>2017/7/30</a:t>
             </a:fld>
             <a:endParaRPr lang="zh-CN" altLang="en-US"/>
           </a:p>
@@ -2561,10 +2562,9 @@
           <a:lstStyle/>
           <a:p>
             <a:r>
-              <a:rPr lang="zh-CN" altLang="en-US" smtClean="0"/>
+              <a:rPr lang="zh-CN" altLang="en-US"/>
               <a:t>单击此处编辑母版标题样式</a:t>
             </a:r>
-            <a:endParaRPr lang="zh-CN" altLang="en-US"/>
           </a:p>
         </p:txBody>
       </p:sp>
@@ -2595,38 +2595,37 @@
           <a:p>
             <a:pPr lvl="0"/>
             <a:r>
-              <a:rPr lang="zh-CN" altLang="en-US" smtClean="0"/>
+              <a:rPr lang="zh-CN" altLang="en-US"/>
               <a:t>单击此处编辑母版文本样式</a:t>
             </a:r>
           </a:p>
           <a:p>
             <a:pPr lvl="1"/>
             <a:r>
-              <a:rPr lang="zh-CN" altLang="en-US" smtClean="0"/>
+              <a:rPr lang="zh-CN" altLang="en-US"/>
               <a:t>第二级</a:t>
             </a:r>
           </a:p>
           <a:p>
             <a:pPr lvl="2"/>
             <a:r>
-              <a:rPr lang="zh-CN" altLang="en-US" smtClean="0"/>
+              <a:rPr lang="zh-CN" altLang="en-US"/>
               <a:t>第三级</a:t>
             </a:r>
           </a:p>
           <a:p>
             <a:pPr lvl="3"/>
             <a:r>
-              <a:rPr lang="zh-CN" altLang="en-US" smtClean="0"/>
+              <a:rPr lang="zh-CN" altLang="en-US"/>
               <a:t>第四级</a:t>
             </a:r>
           </a:p>
           <a:p>
             <a:pPr lvl="4"/>
             <a:r>
-              <a:rPr lang="zh-CN" altLang="en-US" smtClean="0"/>
+              <a:rPr lang="zh-CN" altLang="en-US"/>
               <a:t>第五级</a:t>
             </a:r>
-            <a:endParaRPr lang="zh-CN" altLang="en-US"/>
           </a:p>
         </p:txBody>
       </p:sp>
@@ -2665,7 +2664,7 @@
           <a:p>
             <a:fld id="{530820CF-B880-4189-942D-D702A7CBA730}" type="datetimeFigureOut">
               <a:rPr lang="zh-CN" altLang="en-US" smtClean="0"/>
-              <a:t>2017/7/29</a:t>
+              <a:t>2017/7/30</a:t>
             </a:fld>
             <a:endParaRPr lang="zh-CN" altLang="en-US"/>
           </a:p>
@@ -3178,13 +3177,15 @@
       <p:cxnSp>
         <p:nvCxnSpPr>
           <p:cNvPr id="11" name="直接箭头连接符 10"/>
-          <p:cNvCxnSpPr/>
+          <p:cNvCxnSpPr>
+            <a:cxnSpLocks/>
+          </p:cNvCxnSpPr>
           <p:nvPr/>
         </p:nvCxnSpPr>
         <p:spPr>
           <a:xfrm flipV="1">
-            <a:off x="899592" y="2204864"/>
-            <a:ext cx="4248472" cy="1872208"/>
+            <a:off x="827584" y="1697605"/>
+            <a:ext cx="2569046" cy="2614925"/>
           </a:xfrm>
           <a:prstGeom prst="straightConnector1">
             <a:avLst/>
@@ -3214,13 +3215,15 @@
       <p:cxnSp>
         <p:nvCxnSpPr>
           <p:cNvPr id="12" name="直接箭头连接符 11"/>
-          <p:cNvCxnSpPr/>
+          <p:cNvCxnSpPr>
+            <a:cxnSpLocks/>
+          </p:cNvCxnSpPr>
           <p:nvPr/>
         </p:nvCxnSpPr>
         <p:spPr>
           <a:xfrm flipV="1">
-            <a:off x="1115616" y="2779699"/>
-            <a:ext cx="4248472" cy="1872208"/>
+            <a:off x="2159269" y="2924944"/>
+            <a:ext cx="2589138" cy="2757496"/>
           </a:xfrm>
           <a:prstGeom prst="straightConnector1">
             <a:avLst/>
@@ -3250,13 +3253,15 @@
       <p:cxnSp>
         <p:nvCxnSpPr>
           <p:cNvPr id="13" name="直接箭头连接符 12"/>
-          <p:cNvCxnSpPr/>
+          <p:cNvCxnSpPr>
+            <a:cxnSpLocks/>
+          </p:cNvCxnSpPr>
           <p:nvPr/>
         </p:nvCxnSpPr>
         <p:spPr>
           <a:xfrm>
-            <a:off x="908897" y="4135606"/>
-            <a:ext cx="216024" cy="504056"/>
+            <a:off x="882440" y="4347143"/>
+            <a:ext cx="1252332" cy="1314105"/>
           </a:xfrm>
           <a:prstGeom prst="straightConnector1">
             <a:avLst/>
@@ -3284,13 +3289,15 @@
       <p:cxnSp>
         <p:nvCxnSpPr>
           <p:cNvPr id="14" name="直接箭头连接符 13"/>
-          <p:cNvCxnSpPr/>
+          <p:cNvCxnSpPr>
+            <a:cxnSpLocks/>
+          </p:cNvCxnSpPr>
           <p:nvPr/>
         </p:nvCxnSpPr>
         <p:spPr>
           <a:xfrm>
-            <a:off x="4283968" y="2636912"/>
-            <a:ext cx="216024" cy="504056"/>
+            <a:off x="3203848" y="1952326"/>
+            <a:ext cx="1224136" cy="1271511"/>
           </a:xfrm>
           <a:prstGeom prst="straightConnector1">
             <a:avLst/>
@@ -3318,13 +3325,15 @@
       <p:cxnSp>
         <p:nvCxnSpPr>
           <p:cNvPr id="20" name="直接箭头连接符 19"/>
-          <p:cNvCxnSpPr/>
+          <p:cNvCxnSpPr>
+            <a:cxnSpLocks/>
+          </p:cNvCxnSpPr>
           <p:nvPr/>
         </p:nvCxnSpPr>
         <p:spPr>
           <a:xfrm>
-            <a:off x="908897" y="4077072"/>
-            <a:ext cx="1574871" cy="0"/>
+            <a:off x="881003" y="4347143"/>
+            <a:ext cx="5031255" cy="46783"/>
           </a:xfrm>
           <a:prstGeom prst="straightConnector1">
             <a:avLst/>
@@ -3349,46 +3358,18 @@
           </a:fontRef>
         </p:style>
       </p:cxnSp>
-      <p:sp>
-        <p:nvSpPr>
-          <p:cNvPr id="23" name="TextBox 22"/>
-          <p:cNvSpPr txBox="1"/>
-          <p:nvPr/>
-        </p:nvSpPr>
-        <p:spPr>
-          <a:xfrm>
-            <a:off x="603840" y="4252096"/>
-            <a:ext cx="306494" cy="369332"/>
-          </a:xfrm>
-          <a:prstGeom prst="rect">
-            <a:avLst/>
-          </a:prstGeom>
-          <a:noFill/>
-        </p:spPr>
-        <p:txBody>
-          <a:bodyPr wrap="none" rtlCol="0">
-            <a:spAutoFit/>
-          </a:bodyPr>
-          <a:lstStyle/>
-          <a:p>
-            <a:r>
-              <a:rPr lang="en-US" altLang="zh-CN" dirty="0" smtClean="0"/>
-              <a:t>d</a:t>
-            </a:r>
-            <a:endParaRPr lang="zh-CN" altLang="en-US" dirty="0"/>
-          </a:p>
-        </p:txBody>
-      </p:sp>
       <p:cxnSp>
         <p:nvCxnSpPr>
           <p:cNvPr id="25" name="直接箭头连接符 24"/>
-          <p:cNvCxnSpPr/>
+          <p:cNvCxnSpPr>
+            <a:cxnSpLocks/>
+          </p:cNvCxnSpPr>
           <p:nvPr/>
         </p:nvCxnSpPr>
         <p:spPr>
           <a:xfrm flipH="1" flipV="1">
-            <a:off x="1403648" y="3861048"/>
-            <a:ext cx="144016" cy="216024"/>
+            <a:off x="1217091" y="3994076"/>
+            <a:ext cx="164981" cy="362601"/>
           </a:xfrm>
           <a:prstGeom prst="straightConnector1">
             <a:avLst/>
@@ -3420,7 +3401,7 @@
         </p:nvSpPr>
         <p:spPr>
           <a:xfrm>
-            <a:off x="1612430" y="3733752"/>
+            <a:off x="1332724" y="3926640"/>
             <a:ext cx="295274" cy="369332"/>
           </a:xfrm>
           <a:prstGeom prst="rect">
@@ -3435,7 +3416,7 @@
           <a:lstStyle/>
           <a:p>
             <a:r>
-              <a:rPr lang="en-US" altLang="zh-CN" dirty="0" smtClean="0"/>
+              <a:rPr lang="en-US" altLang="zh-CN" dirty="0"/>
               <a:t>a</a:t>
             </a:r>
             <a:endParaRPr lang="zh-CN" altLang="en-US" dirty="0"/>
@@ -3444,19 +3425,28 @@
       </p:sp>
       <p:cxnSp>
         <p:nvCxnSpPr>
-          <p:cNvPr id="28" name="直接箭头连接符 27"/>
-          <p:cNvCxnSpPr/>
+          <p:cNvPr id="41" name="直接箭头连接符 40">
+            <a:extLst>
+              <a:ext uri="{FF2B5EF4-FFF2-40B4-BE49-F238E27FC236}">
+                <a16:creationId xmlns:a16="http://schemas.microsoft.com/office/drawing/2014/main" id="{57D59F57-08D5-4855-B3A6-E74AB4FA8EE2}"/>
+              </a:ext>
+            </a:extLst>
+          </p:cNvPr>
+          <p:cNvCxnSpPr>
+            <a:cxnSpLocks/>
+          </p:cNvCxnSpPr>
           <p:nvPr/>
         </p:nvCxnSpPr>
         <p:spPr>
-          <a:xfrm>
-            <a:off x="1763645" y="4077072"/>
-            <a:ext cx="92130" cy="288032"/>
+          <a:xfrm flipV="1">
+            <a:off x="827584" y="1628800"/>
+            <a:ext cx="0" cy="4905816"/>
           </a:xfrm>
           <a:prstGeom prst="straightConnector1">
             <a:avLst/>
           </a:prstGeom>
           <a:ln>
+            <a:prstDash val="dash"/>
             <a:tailEnd type="arrow"/>
           </a:ln>
         </p:spPr>
@@ -3475,46 +3465,24 @@
           </a:fontRef>
         </p:style>
       </p:cxnSp>
-      <p:sp>
-        <p:nvSpPr>
-          <p:cNvPr id="30" name="TextBox 29"/>
-          <p:cNvSpPr txBox="1"/>
-          <p:nvPr/>
-        </p:nvSpPr>
-        <p:spPr>
-          <a:xfrm>
-            <a:off x="1440451" y="4064588"/>
-            <a:ext cx="295274" cy="369332"/>
-          </a:xfrm>
-          <a:prstGeom prst="rect">
-            <a:avLst/>
-          </a:prstGeom>
-          <a:noFill/>
-        </p:spPr>
-        <p:txBody>
-          <a:bodyPr wrap="none" rtlCol="0">
-            <a:spAutoFit/>
-          </a:bodyPr>
-          <a:lstStyle/>
-          <a:p>
-            <a:r>
-              <a:rPr lang="en-US" altLang="zh-CN" dirty="0" smtClean="0"/>
-              <a:t>a</a:t>
-            </a:r>
-            <a:endParaRPr lang="zh-CN" altLang="en-US" dirty="0"/>
-          </a:p>
-        </p:txBody>
-      </p:sp>
       <p:cxnSp>
         <p:nvCxnSpPr>
-          <p:cNvPr id="32" name="直接箭头连接符 31"/>
-          <p:cNvCxnSpPr/>
+          <p:cNvPr id="46" name="直接箭头连接符 45">
+            <a:extLst>
+              <a:ext uri="{FF2B5EF4-FFF2-40B4-BE49-F238E27FC236}">
+                <a16:creationId xmlns:a16="http://schemas.microsoft.com/office/drawing/2014/main" id="{812CD9D2-670F-46DA-ABD5-86122610EF0B}"/>
+              </a:ext>
+            </a:extLst>
+          </p:cNvPr>
+          <p:cNvCxnSpPr>
+            <a:cxnSpLocks/>
+          </p:cNvCxnSpPr>
           <p:nvPr/>
         </p:nvCxnSpPr>
         <p:spPr>
           <a:xfrm>
-            <a:off x="2483768" y="4077072"/>
-            <a:ext cx="0" cy="648072"/>
+            <a:off x="850202" y="5695861"/>
+            <a:ext cx="1261905" cy="0"/>
           </a:xfrm>
           <a:prstGeom prst="straightConnector1">
             <a:avLst/>
@@ -3541,13 +3509,19 @@
       </p:cxnSp>
       <p:sp>
         <p:nvSpPr>
-          <p:cNvPr id="35" name="TextBox 34"/>
+          <p:cNvPr id="37" name="文本框 36">
+            <a:extLst>
+              <a:ext uri="{FF2B5EF4-FFF2-40B4-BE49-F238E27FC236}">
+                <a16:creationId xmlns:a16="http://schemas.microsoft.com/office/drawing/2014/main" id="{3EAC40A9-14FA-4AFE-8D83-6F02E31657B0}"/>
+              </a:ext>
+            </a:extLst>
+          </p:cNvPr>
           <p:cNvSpPr txBox="1"/>
           <p:nvPr/>
         </p:nvSpPr>
         <p:spPr>
           <a:xfrm>
-            <a:off x="1564518" y="4671860"/>
+            <a:off x="1087547" y="5594210"/>
             <a:ext cx="405880" cy="369332"/>
           </a:xfrm>
           <a:prstGeom prst="rect">
@@ -3562,8 +3536,80 @@
           <a:lstStyle/>
           <a:p>
             <a:r>
-              <a:rPr lang="en-US" altLang="zh-CN" dirty="0" smtClean="0"/>
+              <a:rPr lang="en-US" altLang="zh-CN" dirty="0"/>
               <a:t>dx</a:t>
+            </a:r>
+            <a:endParaRPr lang="zh-CN" altLang="en-US" dirty="0"/>
+          </a:p>
+        </p:txBody>
+      </p:sp>
+      <p:sp>
+        <p:nvSpPr>
+          <p:cNvPr id="47" name="文本框 46">
+            <a:extLst>
+              <a:ext uri="{FF2B5EF4-FFF2-40B4-BE49-F238E27FC236}">
+                <a16:creationId xmlns:a16="http://schemas.microsoft.com/office/drawing/2014/main" id="{F443345C-2908-46F5-ADF1-84855DFE9A70}"/>
+              </a:ext>
+            </a:extLst>
+          </p:cNvPr>
+          <p:cNvSpPr txBox="1"/>
+          <p:nvPr/>
+        </p:nvSpPr>
+        <p:spPr>
+          <a:xfrm>
+            <a:off x="394277" y="5111587"/>
+            <a:ext cx="410690" cy="369332"/>
+          </a:xfrm>
+          <a:prstGeom prst="rect">
+            <a:avLst/>
+          </a:prstGeom>
+          <a:noFill/>
+        </p:spPr>
+        <p:txBody>
+          <a:bodyPr wrap="none" rtlCol="0">
+            <a:spAutoFit/>
+          </a:bodyPr>
+          <a:lstStyle/>
+          <a:p>
+            <a:r>
+              <a:rPr lang="en-US" altLang="zh-CN" dirty="0" err="1"/>
+              <a:t>dy</a:t>
+            </a:r>
+            <a:endParaRPr lang="zh-CN" altLang="en-US" dirty="0"/>
+          </a:p>
+        </p:txBody>
+      </p:sp>
+      <p:sp>
+        <p:nvSpPr>
+          <p:cNvPr id="48" name="TextBox 26">
+            <a:extLst>
+              <a:ext uri="{FF2B5EF4-FFF2-40B4-BE49-F238E27FC236}">
+                <a16:creationId xmlns:a16="http://schemas.microsoft.com/office/drawing/2014/main" id="{FC4CA23F-38E8-42EC-A44F-BFF87B7C30CA}"/>
+              </a:ext>
+            </a:extLst>
+          </p:cNvPr>
+          <p:cNvSpPr txBox="1"/>
+          <p:nvPr/>
+        </p:nvSpPr>
+        <p:spPr>
+          <a:xfrm>
+            <a:off x="906250" y="4725144"/>
+            <a:ext cx="295274" cy="369332"/>
+          </a:xfrm>
+          <a:prstGeom prst="rect">
+            <a:avLst/>
+          </a:prstGeom>
+          <a:noFill/>
+        </p:spPr>
+        <p:txBody>
+          <a:bodyPr wrap="none" rtlCol="0">
+            <a:spAutoFit/>
+          </a:bodyPr>
+          <a:lstStyle/>
+          <a:p>
+            <a:r>
+              <a:rPr lang="en-US" altLang="zh-CN" dirty="0"/>
+              <a:t>a</a:t>
             </a:r>
             <a:endParaRPr lang="zh-CN" altLang="en-US" dirty="0"/>
           </a:p>
@@ -3571,20 +3617,27 @@
       </p:sp>
       <p:cxnSp>
         <p:nvCxnSpPr>
-          <p:cNvPr id="36" name="直接箭头连接符 35"/>
-          <p:cNvCxnSpPr/>
+          <p:cNvPr id="49" name="直接箭头连接符 48">
+            <a:extLst>
+              <a:ext uri="{FF2B5EF4-FFF2-40B4-BE49-F238E27FC236}">
+                <a16:creationId xmlns:a16="http://schemas.microsoft.com/office/drawing/2014/main" id="{AFF30B61-B825-4A64-9983-6060541972CD}"/>
+              </a:ext>
+            </a:extLst>
+          </p:cNvPr>
+          <p:cNvCxnSpPr>
+            <a:cxnSpLocks/>
+          </p:cNvCxnSpPr>
           <p:nvPr/>
         </p:nvCxnSpPr>
         <p:spPr>
-          <a:xfrm>
-            <a:off x="1187624" y="4651907"/>
-            <a:ext cx="1296144" cy="0"/>
+          <a:xfrm flipH="1">
+            <a:off x="825427" y="4725144"/>
+            <a:ext cx="290189" cy="73006"/>
           </a:xfrm>
           <a:prstGeom prst="straightConnector1">
             <a:avLst/>
           </a:prstGeom>
           <a:ln>
-            <a:prstDash val="dash"/>
             <a:tailEnd type="arrow"/>
           </a:ln>
         </p:spPr>
@@ -3605,14 +3658,20 @@
       </p:cxnSp>
       <p:sp>
         <p:nvSpPr>
-          <p:cNvPr id="39" name="TextBox 38"/>
+          <p:cNvPr id="52" name="文本框 51">
+            <a:extLst>
+              <a:ext uri="{FF2B5EF4-FFF2-40B4-BE49-F238E27FC236}">
+                <a16:creationId xmlns:a16="http://schemas.microsoft.com/office/drawing/2014/main" id="{6FD2E4E4-6771-48FB-BFBC-91009A3BA7B9}"/>
+              </a:ext>
+            </a:extLst>
+          </p:cNvPr>
           <p:cNvSpPr txBox="1"/>
           <p:nvPr/>
         </p:nvSpPr>
         <p:spPr>
           <a:xfrm>
-            <a:off x="2488165" y="4180438"/>
-            <a:ext cx="410690" cy="369332"/>
+            <a:off x="4572000" y="5517232"/>
+            <a:ext cx="1553630" cy="646331"/>
           </a:xfrm>
           <a:prstGeom prst="rect">
             <a:avLst/>
@@ -3626,56 +3685,43 @@
           <a:lstStyle/>
           <a:p>
             <a:r>
-              <a:rPr lang="en-US" altLang="zh-CN" dirty="0" smtClean="0"/>
+              <a:rPr lang="en-US" altLang="zh-CN" dirty="0"/>
+              <a:t>Sin(a) = dx /d</a:t>
+            </a:r>
+          </a:p>
+          <a:p>
+            <a:r>
+              <a:rPr lang="en-US" altLang="zh-CN" dirty="0"/>
+              <a:t>Cos(a) = -</a:t>
+            </a:r>
+            <a:r>
+              <a:rPr lang="en-US" altLang="zh-CN" dirty="0" err="1"/>
               <a:t>dy</a:t>
             </a:r>
+            <a:r>
+              <a:rPr lang="en-US" altLang="zh-CN" dirty="0"/>
+              <a:t>/d </a:t>
+            </a:r>
             <a:endParaRPr lang="zh-CN" altLang="en-US" dirty="0"/>
           </a:p>
         </p:txBody>
       </p:sp>
-      <p:cxnSp>
-        <p:nvCxnSpPr>
-          <p:cNvPr id="40" name="直接箭头连接符 39"/>
-          <p:cNvCxnSpPr/>
-          <p:nvPr/>
-        </p:nvCxnSpPr>
-        <p:spPr>
-          <a:xfrm>
-            <a:off x="1547664" y="4437341"/>
-            <a:ext cx="16854" cy="202321"/>
-          </a:xfrm>
-          <a:prstGeom prst="straightConnector1">
-            <a:avLst/>
-          </a:prstGeom>
-          <a:ln>
-            <a:tailEnd type="arrow"/>
-          </a:ln>
-        </p:spPr>
-        <p:style>
-          <a:lnRef idx="1">
-            <a:schemeClr val="accent1"/>
-          </a:lnRef>
-          <a:fillRef idx="0">
-            <a:schemeClr val="accent1"/>
-          </a:fillRef>
-          <a:effectRef idx="0">
-            <a:schemeClr val="accent1"/>
-          </a:effectRef>
-          <a:fontRef idx="minor">
-            <a:schemeClr val="tx1"/>
-          </a:fontRef>
-        </p:style>
-      </p:cxnSp>
-      <p:sp>
-        <p:nvSpPr>
-          <p:cNvPr id="42" name="TextBox 41"/>
+      <p:sp>
+        <p:nvSpPr>
+          <p:cNvPr id="53" name="文本框 52">
+            <a:extLst>
+              <a:ext uri="{FF2B5EF4-FFF2-40B4-BE49-F238E27FC236}">
+                <a16:creationId xmlns:a16="http://schemas.microsoft.com/office/drawing/2014/main" id="{D078529C-E127-4FC2-AF73-1E186026D7A5}"/>
+              </a:ext>
+            </a:extLst>
+          </p:cNvPr>
           <p:cNvSpPr txBox="1"/>
           <p:nvPr/>
         </p:nvSpPr>
         <p:spPr>
           <a:xfrm>
-            <a:off x="1688059" y="4353835"/>
-            <a:ext cx="295274" cy="369332"/>
+            <a:off x="1582706" y="4771019"/>
+            <a:ext cx="306494" cy="369332"/>
           </a:xfrm>
           <a:prstGeom prst="rect">
             <a:avLst/>
@@ -3689,110 +3735,8 @@
           <a:lstStyle/>
           <a:p>
             <a:r>
-              <a:rPr lang="en-US" altLang="zh-CN" dirty="0" smtClean="0"/>
-              <a:t>a</a:t>
-            </a:r>
-            <a:endParaRPr lang="zh-CN" altLang="en-US" dirty="0"/>
-          </a:p>
-        </p:txBody>
-      </p:sp>
-      <p:sp>
-        <p:nvSpPr>
-          <p:cNvPr id="43" name="TextBox 42"/>
-          <p:cNvSpPr txBox="1"/>
-          <p:nvPr/>
-        </p:nvSpPr>
-        <p:spPr>
-          <a:xfrm>
-            <a:off x="840995" y="5589240"/>
-            <a:ext cx="1269322" cy="646331"/>
-          </a:xfrm>
-          <a:prstGeom prst="rect">
-            <a:avLst/>
-          </a:prstGeom>
-          <a:noFill/>
-        </p:spPr>
-        <p:txBody>
-          <a:bodyPr wrap="none" rtlCol="0">
-            <a:spAutoFit/>
-          </a:bodyPr>
-          <a:lstStyle/>
-          <a:p>
-            <a:r>
-              <a:rPr lang="en-US" altLang="zh-CN" dirty="0" smtClean="0"/>
-              <a:t>d/c = tan(a)</a:t>
-            </a:r>
-          </a:p>
-          <a:p>
-            <a:r>
-              <a:rPr lang="en-US" altLang="zh-CN" dirty="0" smtClean="0"/>
-              <a:t>c=d/tan(a)</a:t>
-            </a:r>
-            <a:endParaRPr lang="zh-CN" altLang="en-US" dirty="0"/>
-          </a:p>
-        </p:txBody>
-      </p:sp>
-      <p:sp>
-        <p:nvSpPr>
-          <p:cNvPr id="44" name="TextBox 43"/>
-          <p:cNvSpPr txBox="1"/>
-          <p:nvPr/>
-        </p:nvSpPr>
-        <p:spPr>
-          <a:xfrm>
-            <a:off x="1983333" y="4109213"/>
-            <a:ext cx="282450" cy="369332"/>
-          </a:xfrm>
-          <a:prstGeom prst="rect">
-            <a:avLst/>
-          </a:prstGeom>
-          <a:noFill/>
-        </p:spPr>
-        <p:txBody>
-          <a:bodyPr wrap="none" rtlCol="0">
-            <a:spAutoFit/>
-          </a:bodyPr>
-          <a:lstStyle/>
-          <a:p>
-            <a:r>
-              <a:rPr lang="en-US" altLang="zh-CN" dirty="0" smtClean="0"/>
-              <a:t>c</a:t>
-            </a:r>
-            <a:endParaRPr lang="zh-CN" altLang="en-US" dirty="0"/>
-          </a:p>
-        </p:txBody>
-      </p:sp>
-      <p:sp>
-        <p:nvSpPr>
-          <p:cNvPr id="45" name="TextBox 44"/>
-          <p:cNvSpPr txBox="1"/>
-          <p:nvPr/>
-        </p:nvSpPr>
-        <p:spPr>
-          <a:xfrm>
-            <a:off x="3995936" y="4856526"/>
-            <a:ext cx="1369606" cy="646331"/>
-          </a:xfrm>
-          <a:prstGeom prst="rect">
-            <a:avLst/>
-          </a:prstGeom>
-          <a:noFill/>
-        </p:spPr>
-        <p:txBody>
-          <a:bodyPr wrap="none" rtlCol="0">
-            <a:spAutoFit/>
-          </a:bodyPr>
-          <a:lstStyle/>
-          <a:p>
-            <a:r>
-              <a:rPr lang="en-US" altLang="zh-CN" dirty="0" smtClean="0"/>
-              <a:t>dx/c = cos(a)</a:t>
-            </a:r>
-          </a:p>
-          <a:p>
-            <a:r>
-              <a:rPr lang="en-US" altLang="zh-CN" dirty="0" smtClean="0"/>
-              <a:t>dy/c= sin(a)</a:t>
+              <a:rPr lang="en-US" altLang="zh-CN" dirty="0"/>
+              <a:t>d</a:t>
             </a:r>
             <a:endParaRPr lang="zh-CN" altLang="en-US" dirty="0"/>
           </a:p>

</xml_diff>